<commit_message>
added a,b slides to ppt
</commit_message>
<xml_diff>
--- a/09. Sprint3 Final Presentation/FinalPresentation.pptx
+++ b/09. Sprint3 Final Presentation/FinalPresentation.pptx
@@ -6,17 +6,18 @@
   </p:sldMasterIdLst>
   <p:sldIdLst>
     <p:sldId id="256" r:id="rId2"/>
-    <p:sldId id="262" r:id="rId3"/>
-    <p:sldId id="257" r:id="rId4"/>
-    <p:sldId id="258" r:id="rId5"/>
-    <p:sldId id="266" r:id="rId6"/>
-    <p:sldId id="259" r:id="rId7"/>
-    <p:sldId id="272" r:id="rId8"/>
-    <p:sldId id="264" r:id="rId9"/>
-    <p:sldId id="267" r:id="rId10"/>
-    <p:sldId id="268" r:id="rId11"/>
-    <p:sldId id="269" r:id="rId12"/>
-    <p:sldId id="271" r:id="rId13"/>
+    <p:sldId id="273" r:id="rId3"/>
+    <p:sldId id="274" r:id="rId4"/>
+    <p:sldId id="275" r:id="rId5"/>
+    <p:sldId id="258" r:id="rId6"/>
+    <p:sldId id="266" r:id="rId7"/>
+    <p:sldId id="259" r:id="rId8"/>
+    <p:sldId id="272" r:id="rId9"/>
+    <p:sldId id="264" r:id="rId10"/>
+    <p:sldId id="267" r:id="rId11"/>
+    <p:sldId id="268" r:id="rId12"/>
+    <p:sldId id="269" r:id="rId13"/>
+    <p:sldId id="271" r:id="rId14"/>
   </p:sldIdLst>
   <p:sldSz cx="12192000" cy="6858000"/>
   <p:notesSz cx="6858000" cy="9144000"/>
@@ -117,7 +118,7 @@
   </p:defaultTextStyle>
   <p:extLst>
     <p:ext uri="{EFAFB233-063F-42B5-8137-9DF3F51BA10A}">
-      <p15:sldGuideLst xmlns:p15="http://schemas.microsoft.com/office/powerpoint/2012/main">
+      <p15:sldGuideLst xmlns:p15="http://schemas.microsoft.com/office/powerpoint/2012/main" xmlns="">
         <p15:guide id="1" orient="horz" pos="2160">
           <p15:clr>
             <a:srgbClr val="A4A3A4"/>
@@ -3251,7 +3252,7 @@
             <a:pPr algn="ctr"/>
             <a:r>
               <a:rPr lang="en-US" b="1" dirty="0" smtClean="0"/>
-              <a:t>Sprint 3 – Description of tasks (3/4)</a:t>
+              <a:t>Sprint 3 – Description of tasks (2/4)</a:t>
             </a:r>
             <a:endParaRPr lang="en-US" dirty="0"/>
           </a:p>
@@ -3286,24 +3287,28 @@
               <a:buNone/>
             </a:pPr>
             <a:r>
+              <a:rPr lang="en-US" dirty="0" smtClean="0"/>
+              <a:t>6. Debug the </a:t>
+            </a:r>
+            <a:r>
+              <a:rPr lang="en-US" i="1" dirty="0" smtClean="0"/>
+              <a:t>Rank</a:t>
+            </a:r>
+            <a:r>
+              <a:rPr lang="en-US" dirty="0" smtClean="0"/>
+              <a:t> class through adding test cases that handle all possibilities of poker-hands in the </a:t>
+            </a:r>
+            <a:r>
+              <a:rPr lang="en-US" i="1" dirty="0" err="1" smtClean="0"/>
+              <a:t>TestRank</a:t>
+            </a:r>
+            <a:r>
               <a:rPr lang="en-US" dirty="0"/>
-              <a:t>7</a:t>
+              <a:t> </a:t>
             </a:r>
             <a:r>
               <a:rPr lang="en-US" dirty="0" smtClean="0"/>
-              <a:t>. Debug the </a:t>
-            </a:r>
-            <a:r>
-              <a:rPr lang="en-US" i="1" dirty="0" smtClean="0"/>
-              <a:t>GUI</a:t>
-            </a:r>
-            <a:r>
-              <a:rPr lang="en-US" dirty="0" smtClean="0"/>
-              <a:t> portion of the game by play-testing the game with all possible user inputs. </a:t>
-            </a:r>
-            <a:r>
-              <a:rPr lang="en-US" dirty="0" smtClean="0"/>
-              <a:t>(</a:t>
+              <a:t>class. (</a:t>
             </a:r>
             <a:r>
               <a:rPr lang="en-US" dirty="0"/>
@@ -3324,7 +3329,7 @@
     </p:spTree>
     <p:extLst>
       <p:ext uri="{BB962C8B-B14F-4D97-AF65-F5344CB8AC3E}">
-        <p14:creationId xmlns:p14="http://schemas.microsoft.com/office/powerpoint/2010/main" val="3916496294"/>
+        <p14:creationId xmlns:p14="http://schemas.microsoft.com/office/powerpoint/2010/main" val="414686561"/>
       </p:ext>
     </p:extLst>
   </p:cSld>
@@ -3381,6 +3386,132 @@
             <a:pPr algn="ctr"/>
             <a:r>
               <a:rPr lang="en-US" b="1" dirty="0" smtClean="0"/>
+              <a:t>Sprint 3 – Description of tasks (3/4)</a:t>
+            </a:r>
+            <a:endParaRPr lang="en-US" dirty="0"/>
+          </a:p>
+        </p:txBody>
+      </p:sp>
+      <p:sp>
+        <p:nvSpPr>
+          <p:cNvPr id="3" name="내용 개체 틀 2"/>
+          <p:cNvSpPr>
+            <a:spLocks noGrp="1"/>
+          </p:cNvSpPr>
+          <p:nvPr>
+            <p:ph idx="1"/>
+          </p:nvPr>
+        </p:nvSpPr>
+        <p:spPr>
+          <a:xfrm>
+            <a:off x="411892" y="1958457"/>
+            <a:ext cx="11467070" cy="4144169"/>
+          </a:xfrm>
+        </p:spPr>
+        <p:txBody>
+          <a:bodyPr anchor="t">
+            <a:normAutofit/>
+          </a:bodyPr>
+          <a:lstStyle/>
+          <a:p>
+            <a:pPr marL="0" indent="0" algn="ctr">
+              <a:lnSpc>
+                <a:spcPct val="110000"/>
+              </a:lnSpc>
+              <a:buNone/>
+            </a:pPr>
+            <a:r>
+              <a:rPr lang="en-US" dirty="0"/>
+              <a:t>7</a:t>
+            </a:r>
+            <a:r>
+              <a:rPr lang="en-US" dirty="0" smtClean="0"/>
+              <a:t>. Debug the </a:t>
+            </a:r>
+            <a:r>
+              <a:rPr lang="en-US" i="1" dirty="0" smtClean="0"/>
+              <a:t>GUI</a:t>
+            </a:r>
+            <a:r>
+              <a:rPr lang="en-US" dirty="0" smtClean="0"/>
+              <a:t> portion of the game by play-testing the game with all possible user inputs. (</a:t>
+            </a:r>
+            <a:r>
+              <a:rPr lang="en-US" dirty="0"/>
+              <a:t>User Story 4)</a:t>
+            </a:r>
+          </a:p>
+          <a:p>
+            <a:pPr marL="0" indent="0" algn="ctr">
+              <a:lnSpc>
+                <a:spcPct val="110000"/>
+              </a:lnSpc>
+              <a:buNone/>
+            </a:pPr>
+            <a:endParaRPr lang="en-US" dirty="0"/>
+          </a:p>
+        </p:txBody>
+      </p:sp>
+    </p:spTree>
+    <p:extLst>
+      <p:ext uri="{BB962C8B-B14F-4D97-AF65-F5344CB8AC3E}">
+        <p14:creationId xmlns:p14="http://schemas.microsoft.com/office/powerpoint/2010/main" val="3916496294"/>
+      </p:ext>
+    </p:extLst>
+  </p:cSld>
+  <p:clrMapOvr>
+    <a:masterClrMapping/>
+  </p:clrMapOvr>
+  <p:timing>
+    <p:tnLst>
+      <p:par>
+        <p:cTn id="1" dur="indefinite" restart="never" nodeType="tmRoot"/>
+      </p:par>
+    </p:tnLst>
+  </p:timing>
+</p:sld>
+</file>
+
+<file path=ppt/slides/slide12.xml><?xml version="1.0" encoding="utf-8"?>
+<p:sld xmlns:a="http://schemas.openxmlformats.org/drawingml/2006/main" xmlns:r="http://schemas.openxmlformats.org/officeDocument/2006/relationships" xmlns:p="http://schemas.openxmlformats.org/presentationml/2006/main">
+  <p:cSld>
+    <p:spTree>
+      <p:nvGrpSpPr>
+        <p:cNvPr id="1" name=""/>
+        <p:cNvGrpSpPr/>
+        <p:nvPr/>
+      </p:nvGrpSpPr>
+      <p:grpSpPr>
+        <a:xfrm>
+          <a:off x="0" y="0"/>
+          <a:ext cx="0" cy="0"/>
+          <a:chOff x="0" y="0"/>
+          <a:chExt cx="0" cy="0"/>
+        </a:xfrm>
+      </p:grpSpPr>
+      <p:sp>
+        <p:nvSpPr>
+          <p:cNvPr id="2" name="Title 1"/>
+          <p:cNvSpPr>
+            <a:spLocks noGrp="1"/>
+          </p:cNvSpPr>
+          <p:nvPr>
+            <p:ph type="title"/>
+          </p:nvPr>
+        </p:nvSpPr>
+        <p:spPr>
+          <a:xfrm>
+            <a:off x="838200" y="299222"/>
+            <a:ext cx="10515600" cy="1325563"/>
+          </a:xfrm>
+        </p:spPr>
+        <p:txBody>
+          <a:bodyPr/>
+          <a:lstStyle/>
+          <a:p>
+            <a:pPr algn="ctr"/>
+            <a:r>
+              <a:rPr lang="en-US" b="1" dirty="0" smtClean="0"/>
               <a:t>Sprint 3 – Description of tasks (4/4)</a:t>
             </a:r>
             <a:endParaRPr lang="en-US" dirty="0"/>
@@ -3467,7 +3598,7 @@
 </p:sld>
 </file>
 
-<file path=ppt/slides/slide12.xml><?xml version="1.0" encoding="utf-8"?>
+<file path=ppt/slides/slide13.xml><?xml version="1.0" encoding="utf-8"?>
 <p:sld xmlns:a="http://schemas.openxmlformats.org/drawingml/2006/main" xmlns:r="http://schemas.openxmlformats.org/officeDocument/2006/relationships" xmlns:p="http://schemas.openxmlformats.org/presentationml/2006/main">
   <p:cSld>
     <p:spTree>
@@ -3554,7 +3685,7 @@
       </p:grpSpPr>
       <p:sp>
         <p:nvSpPr>
-          <p:cNvPr id="2" name="제목 1"/>
+          <p:cNvPr id="2" name="Title 1"/>
           <p:cNvSpPr>
             <a:spLocks noGrp="1"/>
           </p:cNvSpPr>
@@ -3568,8 +3699,8 @@
           <a:lstStyle/>
           <a:p>
             <a:r>
-              <a:rPr lang="en-US" b="1" dirty="0" smtClean="0"/>
-              <a:t>Problem motivation</a:t>
+              <a:rPr lang="en-US" dirty="0" smtClean="0"/>
+              <a:t>Problem Motivation</a:t>
             </a:r>
             <a:endParaRPr lang="en-US" dirty="0"/>
           </a:p>
@@ -3577,7 +3708,7 @@
       </p:sp>
       <p:sp>
         <p:nvSpPr>
-          <p:cNvPr id="3" name="내용 개체 틀 2"/>
+          <p:cNvPr id="3" name="Content Placeholder 2"/>
           <p:cNvSpPr>
             <a:spLocks noGrp="1"/>
           </p:cNvSpPr>
@@ -3591,27 +3722,33 @@
           <a:lstStyle/>
           <a:p>
             <a:r>
-              <a:rPr lang="en-US" dirty="0"/>
-              <a:t>People need to have fun gambling without losing actual money online. An interactive Texas </a:t>
-            </a:r>
-            <a:r>
-              <a:rPr lang="en-US" dirty="0" err="1"/>
-              <a:t>Hold’em</a:t>
-            </a:r>
-            <a:r>
-              <a:rPr lang="en-US" dirty="0"/>
-              <a:t> </a:t>
-            </a:r>
+              <a:rPr lang="en-US" dirty="0" smtClean="0"/>
+              <a:t>Most of today’s poker games are web-based.</a:t>
+            </a:r>
+          </a:p>
+          <a:p>
+            <a:pPr lvl="1"/>
+            <a:r>
+              <a:rPr lang="en-US" dirty="0" smtClean="0"/>
+              <a:t>Requires internet connection</a:t>
+            </a:r>
+          </a:p>
+          <a:p>
+            <a:pPr lvl="1"/>
+            <a:r>
+              <a:rPr lang="en-US" dirty="0" smtClean="0"/>
+              <a:t>Requires account registration</a:t>
+            </a:r>
+          </a:p>
+          <a:p>
+            <a:pPr lvl="1"/>
+            <a:r>
+              <a:rPr lang="en-US" dirty="0" smtClean="0"/>
+              <a:t>Games played with total strangers</a:t>
+            </a:r>
+          </a:p>
+          <a:p>
             <a:endParaRPr lang="en-US" dirty="0" smtClean="0"/>
-          </a:p>
-          <a:p>
-            <a:endParaRPr lang="en-US" dirty="0"/>
-          </a:p>
-          <a:p>
-            <a:r>
-              <a:rPr lang="en-US" dirty="0"/>
-              <a:t>game can be created to satisfy this need. </a:t>
-            </a:r>
           </a:p>
           <a:p>
             <a:endParaRPr lang="en-US" dirty="0"/>
@@ -3621,20 +3758,13 @@
     </p:spTree>
     <p:extLst>
       <p:ext uri="{BB962C8B-B14F-4D97-AF65-F5344CB8AC3E}">
-        <p14:creationId xmlns:p14="http://schemas.microsoft.com/office/powerpoint/2010/main" val="1894089548"/>
+        <p14:creationId xmlns:p14="http://schemas.microsoft.com/office/powerpoint/2010/main" val="2152369044"/>
       </p:ext>
     </p:extLst>
   </p:cSld>
   <p:clrMapOvr>
     <a:masterClrMapping/>
   </p:clrMapOvr>
-  <p:timing>
-    <p:tnLst>
-      <p:par>
-        <p:cTn id="1" dur="indefinite" restart="never" nodeType="tmRoot"/>
-      </p:par>
-    </p:tnLst>
-  </p:timing>
 </p:sld>
 </file>
 
@@ -3671,8 +3801,8 @@
           <a:lstStyle/>
           <a:p>
             <a:r>
-              <a:rPr lang="en-US" b="1" dirty="0" smtClean="0"/>
-              <a:t>Project goal</a:t>
+              <a:rPr lang="en-US" dirty="0" smtClean="0"/>
+              <a:t>Project Goals</a:t>
             </a:r>
             <a:endParaRPr lang="en-US" dirty="0"/>
           </a:p>
@@ -3680,7 +3810,7 @@
       </p:sp>
       <p:sp>
         <p:nvSpPr>
-          <p:cNvPr id="9" name="내용 개체 틀 8"/>
+          <p:cNvPr id="3" name="Content Placeholder 2"/>
           <p:cNvSpPr>
             <a:spLocks noGrp="1"/>
           </p:cNvSpPr>
@@ -3690,48 +3820,171 @@
         </p:nvSpPr>
         <p:spPr/>
         <p:txBody>
-          <a:bodyPr/>
-          <a:lstStyle/>
-          <a:p>
-            <a:r>
-              <a:rPr lang="en-US" dirty="0"/>
-              <a:t>Our project will create an interactive poker game written in Java that can support up to 8 players by the </a:t>
-            </a:r>
+          <a:bodyPr>
+            <a:normAutofit/>
+          </a:bodyPr>
+          <a:lstStyle/>
+          <a:p>
             <a:r>
               <a:rPr lang="en-US" dirty="0" smtClean="0"/>
-              <a:t>end </a:t>
-            </a:r>
-            <a:r>
-              <a:rPr lang="en-US" dirty="0"/>
-              <a:t>of the semester.</a:t>
-            </a:r>
-          </a:p>
-          <a:p>
+              <a:t>A LAN-based, non-web based </a:t>
+            </a:r>
+            <a:r>
+              <a:rPr lang="en-US" dirty="0" err="1" smtClean="0"/>
+              <a:t>Hold’em</a:t>
+            </a:r>
+            <a:r>
+              <a:rPr lang="en-US" dirty="0" smtClean="0"/>
+              <a:t> game.</a:t>
+            </a:r>
+          </a:p>
+          <a:p>
+            <a:r>
+              <a:rPr lang="en-US" dirty="0" smtClean="0"/>
+              <a:t>Up to 8 players.</a:t>
+            </a:r>
+          </a:p>
+          <a:p>
+            <a:r>
+              <a:rPr lang="en-US" dirty="0" smtClean="0"/>
+              <a:t>Can quickly jump in or out of games.</a:t>
+            </a:r>
+          </a:p>
+          <a:p>
+            <a:r>
+              <a:rPr lang="en-US" dirty="0" smtClean="0"/>
+              <a:t>Clean and simple interface</a:t>
+            </a:r>
+          </a:p>
+          <a:p>
+            <a:pPr lvl="1"/>
+            <a:r>
+              <a:rPr lang="en-US" dirty="0" smtClean="0"/>
+              <a:t>2D graphics for cards and chips</a:t>
+            </a:r>
+          </a:p>
+          <a:p>
+            <a:pPr lvl="1"/>
+            <a:r>
+              <a:rPr lang="en-US" dirty="0" smtClean="0"/>
+              <a:t>Basic animations and sounds</a:t>
+            </a:r>
+          </a:p>
+          <a:p>
+            <a:pPr lvl="1"/>
             <a:endParaRPr lang="en-US" dirty="0" smtClean="0"/>
+          </a:p>
+          <a:p>
+            <a:r>
+              <a:rPr lang="en-US" dirty="0" smtClean="0"/>
+              <a:t>Intuitive onscreen controls.</a:t>
+            </a:r>
+            <a:endParaRPr lang="en-US" dirty="0"/>
           </a:p>
         </p:txBody>
       </p:sp>
     </p:spTree>
     <p:extLst>
       <p:ext uri="{BB962C8B-B14F-4D97-AF65-F5344CB8AC3E}">
-        <p14:creationId xmlns:p14="http://schemas.microsoft.com/office/powerpoint/2010/main" val="1776661256"/>
+        <p14:creationId xmlns:p14="http://schemas.microsoft.com/office/powerpoint/2010/main" val="2026473147"/>
       </p:ext>
     </p:extLst>
   </p:cSld>
   <p:clrMapOvr>
     <a:masterClrMapping/>
   </p:clrMapOvr>
-  <p:timing>
-    <p:tnLst>
-      <p:par>
-        <p:cTn id="1" dur="indefinite" restart="never" nodeType="tmRoot"/>
-      </p:par>
-    </p:tnLst>
-  </p:timing>
 </p:sld>
 </file>
 
 <file path=ppt/slides/slide4.xml><?xml version="1.0" encoding="utf-8"?>
+<p:sld xmlns:a="http://schemas.openxmlformats.org/drawingml/2006/main" xmlns:r="http://schemas.openxmlformats.org/officeDocument/2006/relationships" xmlns:p="http://schemas.openxmlformats.org/presentationml/2006/main">
+  <p:cSld>
+    <p:spTree>
+      <p:nvGrpSpPr>
+        <p:cNvPr id="1" name=""/>
+        <p:cNvGrpSpPr/>
+        <p:nvPr/>
+      </p:nvGrpSpPr>
+      <p:grpSpPr>
+        <a:xfrm>
+          <a:off x="0" y="0"/>
+          <a:ext cx="0" cy="0"/>
+          <a:chOff x="0" y="0"/>
+          <a:chExt cx="0" cy="0"/>
+        </a:xfrm>
+      </p:grpSpPr>
+      <p:sp>
+        <p:nvSpPr>
+          <p:cNvPr id="2" name="Title 1"/>
+          <p:cNvSpPr>
+            <a:spLocks noGrp="1"/>
+          </p:cNvSpPr>
+          <p:nvPr>
+            <p:ph type="title"/>
+          </p:nvPr>
+        </p:nvSpPr>
+        <p:spPr/>
+        <p:txBody>
+          <a:bodyPr/>
+          <a:lstStyle/>
+          <a:p>
+            <a:r>
+              <a:rPr lang="en-US" dirty="0" smtClean="0"/>
+              <a:t>Project Goals</a:t>
+            </a:r>
+            <a:endParaRPr lang="en-US" dirty="0"/>
+          </a:p>
+        </p:txBody>
+      </p:sp>
+      <p:sp>
+        <p:nvSpPr>
+          <p:cNvPr id="3" name="Content Placeholder 2"/>
+          <p:cNvSpPr>
+            <a:spLocks noGrp="1"/>
+          </p:cNvSpPr>
+          <p:nvPr>
+            <p:ph idx="1"/>
+          </p:nvPr>
+        </p:nvSpPr>
+        <p:spPr/>
+        <p:txBody>
+          <a:bodyPr/>
+          <a:lstStyle/>
+          <a:p>
+            <a:r>
+              <a:rPr lang="en-US" dirty="0" smtClean="0"/>
+              <a:t>Performance</a:t>
+            </a:r>
+          </a:p>
+          <a:p>
+            <a:r>
+              <a:rPr lang="en-US" dirty="0" smtClean="0"/>
+              <a:t>Reliability</a:t>
+            </a:r>
+          </a:p>
+          <a:p>
+            <a:r>
+              <a:rPr lang="en-US" dirty="0" smtClean="0"/>
+              <a:t>Usability</a:t>
+            </a:r>
+            <a:endParaRPr lang="en-US" dirty="0"/>
+          </a:p>
+        </p:txBody>
+      </p:sp>
+    </p:spTree>
+    <p:extLst>
+      <p:ext uri="{BB962C8B-B14F-4D97-AF65-F5344CB8AC3E}">
+        <p14:creationId xmlns:p14="http://schemas.microsoft.com/office/powerpoint/2010/main" val="1732382435"/>
+      </p:ext>
+    </p:extLst>
+  </p:cSld>
+  <p:clrMapOvr>
+    <a:masterClrMapping/>
+  </p:clrMapOvr>
+</p:sld>
+</file>
+
+<file path=ppt/slides/slide5.xml><?xml version="1.0" encoding="utf-8"?>
 <p:sld xmlns:a="http://schemas.openxmlformats.org/drawingml/2006/main" xmlns:r="http://schemas.openxmlformats.org/officeDocument/2006/relationships" xmlns:p="http://schemas.openxmlformats.org/presentationml/2006/main">
   <p:cSld>
     <p:spTree>
@@ -3832,7 +4085,7 @@
 </p:sld>
 </file>
 
-<file path=ppt/slides/slide5.xml><?xml version="1.0" encoding="utf-8"?>
+<file path=ppt/slides/slide6.xml><?xml version="1.0" encoding="utf-8"?>
 <p:sld xmlns:a="http://schemas.openxmlformats.org/drawingml/2006/main" xmlns:r="http://schemas.openxmlformats.org/officeDocument/2006/relationships" xmlns:p="http://schemas.openxmlformats.org/presentationml/2006/main">
   <p:cSld>
     <p:spTree>
@@ -3896,74 +4149,6 @@
 </p:sld>
 </file>
 
-<file path=ppt/slides/slide6.xml><?xml version="1.0" encoding="utf-8"?>
-<p:sld xmlns:a="http://schemas.openxmlformats.org/drawingml/2006/main" xmlns:r="http://schemas.openxmlformats.org/officeDocument/2006/relationships" xmlns:p="http://schemas.openxmlformats.org/presentationml/2006/main">
-  <p:cSld>
-    <p:spTree>
-      <p:nvGrpSpPr>
-        <p:cNvPr id="1" name=""/>
-        <p:cNvGrpSpPr/>
-        <p:nvPr/>
-      </p:nvGrpSpPr>
-      <p:grpSpPr>
-        <a:xfrm>
-          <a:off x="0" y="0"/>
-          <a:ext cx="0" cy="0"/>
-          <a:chOff x="0" y="0"/>
-          <a:chExt cx="0" cy="0"/>
-        </a:xfrm>
-      </p:grpSpPr>
-      <p:sp>
-        <p:nvSpPr>
-          <p:cNvPr id="2" name="Title 1"/>
-          <p:cNvSpPr>
-            <a:spLocks noGrp="1"/>
-          </p:cNvSpPr>
-          <p:nvPr>
-            <p:ph type="title"/>
-          </p:nvPr>
-        </p:nvSpPr>
-        <p:spPr>
-          <a:xfrm>
-            <a:off x="952504" y="260757"/>
-            <a:ext cx="10515600" cy="6154945"/>
-          </a:xfrm>
-        </p:spPr>
-        <p:txBody>
-          <a:bodyPr>
-            <a:normAutofit/>
-          </a:bodyPr>
-          <a:lstStyle/>
-          <a:p>
-            <a:pPr algn="ctr"/>
-            <a:r>
-              <a:rPr lang="en-US" sz="8800" b="1" dirty="0" smtClean="0"/>
-              <a:t>DEMO</a:t>
-            </a:r>
-            <a:endParaRPr lang="en-US" sz="8800" dirty="0"/>
-          </a:p>
-        </p:txBody>
-      </p:sp>
-    </p:spTree>
-    <p:extLst>
-      <p:ext uri="{BB962C8B-B14F-4D97-AF65-F5344CB8AC3E}">
-        <p14:creationId xmlns:p14="http://schemas.microsoft.com/office/powerpoint/2010/main" val="2041272136"/>
-      </p:ext>
-    </p:extLst>
-  </p:cSld>
-  <p:clrMapOvr>
-    <a:masterClrMapping/>
-  </p:clrMapOvr>
-  <p:timing>
-    <p:tnLst>
-      <p:par>
-        <p:cTn id="1" dur="indefinite" restart="never" nodeType="tmRoot"/>
-      </p:par>
-    </p:tnLst>
-  </p:timing>
-</p:sld>
-</file>
-
 <file path=ppt/slides/slide7.xml><?xml version="1.0" encoding="utf-8"?>
 <p:sld xmlns:a="http://schemas.openxmlformats.org/drawingml/2006/main" xmlns:r="http://schemas.openxmlformats.org/officeDocument/2006/relationships" xmlns:p="http://schemas.openxmlformats.org/presentationml/2006/main">
   <p:cSld>
@@ -3991,38 +4176,31 @@
             <p:ph type="title"/>
           </p:nvPr>
         </p:nvSpPr>
-        <p:spPr/>
-        <p:txBody>
-          <a:bodyPr/>
-          <a:lstStyle/>
-          <a:p>
-            <a:endParaRPr lang="en-US"/>
-          </a:p>
-        </p:txBody>
-      </p:sp>
-      <p:sp>
-        <p:nvSpPr>
-          <p:cNvPr id="3" name="Content Placeholder 2"/>
-          <p:cNvSpPr>
-            <a:spLocks noGrp="1"/>
-          </p:cNvSpPr>
-          <p:nvPr>
-            <p:ph idx="1"/>
-          </p:nvPr>
-        </p:nvSpPr>
-        <p:spPr/>
-        <p:txBody>
-          <a:bodyPr/>
-          <a:lstStyle/>
-          <a:p>
-            <a:endParaRPr lang="en-US"/>
+        <p:spPr>
+          <a:xfrm>
+            <a:off x="952504" y="260757"/>
+            <a:ext cx="10515600" cy="6154945"/>
+          </a:xfrm>
+        </p:spPr>
+        <p:txBody>
+          <a:bodyPr>
+            <a:normAutofit/>
+          </a:bodyPr>
+          <a:lstStyle/>
+          <a:p>
+            <a:pPr algn="ctr"/>
+            <a:r>
+              <a:rPr lang="en-US" sz="8800" b="1" dirty="0" smtClean="0"/>
+              <a:t>DEMO</a:t>
+            </a:r>
+            <a:endParaRPr lang="en-US" sz="8800" dirty="0"/>
           </a:p>
         </p:txBody>
       </p:sp>
     </p:spTree>
     <p:extLst>
       <p:ext uri="{BB962C8B-B14F-4D97-AF65-F5344CB8AC3E}">
-        <p14:creationId xmlns:p14="http://schemas.microsoft.com/office/powerpoint/2010/main" val="1512136813"/>
+        <p14:creationId xmlns:p14="http://schemas.microsoft.com/office/powerpoint/2010/main" val="2041272136"/>
       </p:ext>
     </p:extLst>
   </p:cSld>
@@ -4066,32 +4244,18 @@
             <p:ph type="title"/>
           </p:nvPr>
         </p:nvSpPr>
-        <p:spPr>
-          <a:xfrm>
-            <a:off x="838200" y="299222"/>
-            <a:ext cx="10515600" cy="1325563"/>
-          </a:xfrm>
-        </p:spPr>
-        <p:txBody>
-          <a:bodyPr/>
-          <a:lstStyle/>
-          <a:p>
-            <a:pPr algn="ctr"/>
-            <a:r>
-              <a:rPr lang="en-US" b="1" dirty="0" smtClean="0"/>
-              <a:t>Sprint 3 – Description of tasks (1/4</a:t>
-            </a:r>
-            <a:r>
-              <a:rPr lang="en-US" b="1" dirty="0" smtClean="0"/>
-              <a:t>)</a:t>
-            </a:r>
-            <a:endParaRPr lang="en-US" dirty="0"/>
-          </a:p>
-        </p:txBody>
-      </p:sp>
-      <p:sp>
-        <p:nvSpPr>
-          <p:cNvPr id="3" name="내용 개체 틀 2"/>
+        <p:spPr/>
+        <p:txBody>
+          <a:bodyPr/>
+          <a:lstStyle/>
+          <a:p>
+            <a:endParaRPr lang="en-US"/>
+          </a:p>
+        </p:txBody>
+      </p:sp>
+      <p:sp>
+        <p:nvSpPr>
+          <p:cNvPr id="3" name="Content Placeholder 2"/>
           <p:cNvSpPr>
             <a:spLocks noGrp="1"/>
           </p:cNvSpPr>
@@ -4099,57 +4263,19 @@
             <p:ph idx="1"/>
           </p:nvPr>
         </p:nvSpPr>
-        <p:spPr>
-          <a:xfrm>
-            <a:off x="411892" y="1958457"/>
-            <a:ext cx="11467070" cy="4144169"/>
-          </a:xfrm>
-        </p:spPr>
-        <p:txBody>
-          <a:bodyPr anchor="t">
-            <a:normAutofit/>
-          </a:bodyPr>
-          <a:lstStyle/>
-          <a:p>
-            <a:pPr marL="0" indent="0" algn="ctr">
-              <a:lnSpc>
-                <a:spcPct val="110000"/>
-              </a:lnSpc>
-              <a:buNone/>
-            </a:pPr>
-            <a:r>
-              <a:rPr lang="en-US" dirty="0" smtClean="0"/>
-              <a:t>1. Integrate the </a:t>
-            </a:r>
-            <a:r>
-              <a:rPr lang="en-US" dirty="0" smtClean="0"/>
-              <a:t>animations to correctly respond to received </a:t>
-            </a:r>
-            <a:r>
-              <a:rPr lang="en-US" i="1" dirty="0" err="1" smtClean="0"/>
-              <a:t>GameState</a:t>
-            </a:r>
-            <a:r>
-              <a:rPr lang="en-US" dirty="0" smtClean="0"/>
-              <a:t> from the host to show each player’s actions. (User Story 1)</a:t>
-            </a:r>
-            <a:endParaRPr lang="en-US" dirty="0"/>
-          </a:p>
-          <a:p>
-            <a:pPr marL="0" indent="0" algn="ctr">
-              <a:lnSpc>
-                <a:spcPct val="110000"/>
-              </a:lnSpc>
-              <a:buNone/>
-            </a:pPr>
-            <a:endParaRPr lang="en-US" dirty="0"/>
+        <p:spPr/>
+        <p:txBody>
+          <a:bodyPr/>
+          <a:lstStyle/>
+          <a:p>
+            <a:endParaRPr lang="en-US"/>
           </a:p>
         </p:txBody>
       </p:sp>
     </p:spTree>
     <p:extLst>
       <p:ext uri="{BB962C8B-B14F-4D97-AF65-F5344CB8AC3E}">
-        <p14:creationId xmlns:p14="http://schemas.microsoft.com/office/powerpoint/2010/main" val="1354750929"/>
+        <p14:creationId xmlns:p14="http://schemas.microsoft.com/office/powerpoint/2010/main" val="1512136813"/>
       </p:ext>
     </p:extLst>
   </p:cSld>
@@ -4206,7 +4332,7 @@
             <a:pPr algn="ctr"/>
             <a:r>
               <a:rPr lang="en-US" b="1" dirty="0" smtClean="0"/>
-              <a:t>Sprint 3 – Description of tasks (2/4)</a:t>
+              <a:t>Sprint 3 – Description of tasks (1/4)</a:t>
             </a:r>
             <a:endParaRPr lang="en-US" dirty="0"/>
           </a:p>
@@ -4242,32 +4368,17 @@
             </a:pPr>
             <a:r>
               <a:rPr lang="en-US" dirty="0" smtClean="0"/>
-              <a:t>6. Debug the </a:t>
-            </a:r>
-            <a:r>
-              <a:rPr lang="en-US" i="1" dirty="0" smtClean="0"/>
-              <a:t>Rank</a:t>
+              <a:t>1. Integrate the animations to correctly respond to received </a:t>
+            </a:r>
+            <a:r>
+              <a:rPr lang="en-US" i="1" dirty="0" err="1" smtClean="0"/>
+              <a:t>GameState</a:t>
             </a:r>
             <a:r>
               <a:rPr lang="en-US" dirty="0" smtClean="0"/>
-              <a:t> class through adding test cases that handle all possibilities of poker-hands in the </a:t>
-            </a:r>
-            <a:r>
-              <a:rPr lang="en-US" i="1" dirty="0" err="1" smtClean="0"/>
-              <a:t>TestRank</a:t>
-            </a:r>
-            <a:r>
-              <a:rPr lang="en-US" dirty="0"/>
-              <a:t> </a:t>
-            </a:r>
-            <a:r>
-              <a:rPr lang="en-US" dirty="0" smtClean="0"/>
-              <a:t>class. (</a:t>
-            </a:r>
-            <a:r>
-              <a:rPr lang="en-US" dirty="0"/>
-              <a:t>User Story 4)</a:t>
-            </a:r>
+              <a:t> from the host to show each player’s actions. (User Story 1)</a:t>
+            </a:r>
+            <a:endParaRPr lang="en-US" dirty="0"/>
           </a:p>
           <a:p>
             <a:pPr marL="0" indent="0" algn="ctr">
@@ -4283,7 +4394,7 @@
     </p:spTree>
     <p:extLst>
       <p:ext uri="{BB962C8B-B14F-4D97-AF65-F5344CB8AC3E}">
-        <p14:creationId xmlns:p14="http://schemas.microsoft.com/office/powerpoint/2010/main" val="414686561"/>
+        <p14:creationId xmlns:p14="http://schemas.microsoft.com/office/powerpoint/2010/main" val="1354750929"/>
       </p:ext>
     </p:extLst>
   </p:cSld>
@@ -4555,7 +4666,7 @@
   <a:extraClrSchemeLst/>
   <a:extLst>
     <a:ext uri="{05A4C25C-085E-4340-85A3-A5531E510DB2}">
-      <thm15:themeFamily xmlns:thm15="http://schemas.microsoft.com/office/thememl/2012/main" name="Office Theme" id="{62F939B6-93AF-4DB8-9C6B-D6C7DFDC589F}" vid="{4F46216B-77A9-411A-B9D3-5023FCB70208}"/>
+      <thm15:themeFamily xmlns:thm15="http://schemas.microsoft.com/office/thememl/2012/main" xmlns="" name="Office Theme" id="{62F939B6-93AF-4DB8-9C6B-D6C7DFDC589F}" vid="{4F46216B-77A9-411A-B9D3-5023FCB70208}"/>
     </a:ext>
   </a:extLst>
 </a:theme>

</xml_diff>

<commit_message>
shortened final ppt drastically
</commit_message>
<xml_diff>
--- a/09. Sprint3 Final Presentation/FinalPresentation.pptx
+++ b/09. Sprint3 Final Presentation/FinalPresentation.pptx
@@ -8,16 +8,10 @@
     <p:sldId id="256" r:id="rId2"/>
     <p:sldId id="273" r:id="rId3"/>
     <p:sldId id="274" r:id="rId4"/>
-    <p:sldId id="275" r:id="rId5"/>
-    <p:sldId id="258" r:id="rId6"/>
-    <p:sldId id="266" r:id="rId7"/>
-    <p:sldId id="259" r:id="rId8"/>
-    <p:sldId id="272" r:id="rId9"/>
-    <p:sldId id="264" r:id="rId10"/>
-    <p:sldId id="267" r:id="rId11"/>
-    <p:sldId id="268" r:id="rId12"/>
-    <p:sldId id="269" r:id="rId13"/>
-    <p:sldId id="271" r:id="rId14"/>
+    <p:sldId id="258" r:id="rId5"/>
+    <p:sldId id="266" r:id="rId6"/>
+    <p:sldId id="259" r:id="rId7"/>
+    <p:sldId id="271" r:id="rId8"/>
   </p:sldIdLst>
   <p:sldSz cx="12192000" cy="6858000"/>
   <p:notesSz cx="6858000" cy="9144000"/>
@@ -118,7 +112,7 @@
   </p:defaultTextStyle>
   <p:extLst>
     <p:ext uri="{EFAFB233-063F-42B5-8137-9DF3F51BA10A}">
-      <p15:sldGuideLst xmlns:p15="http://schemas.microsoft.com/office/powerpoint/2012/main" xmlns="">
+      <p15:sldGuideLst xmlns="" xmlns:p15="http://schemas.microsoft.com/office/powerpoint/2012/main">
         <p15:guide id="1" orient="horz" pos="2160">
           <p15:clr>
             <a:srgbClr val="A4A3A4"/>
@@ -3212,460 +3206,6 @@
 </p:sld>
 </file>
 
-<file path=ppt/slides/slide10.xml><?xml version="1.0" encoding="utf-8"?>
-<p:sld xmlns:a="http://schemas.openxmlformats.org/drawingml/2006/main" xmlns:r="http://schemas.openxmlformats.org/officeDocument/2006/relationships" xmlns:p="http://schemas.openxmlformats.org/presentationml/2006/main">
-  <p:cSld>
-    <p:spTree>
-      <p:nvGrpSpPr>
-        <p:cNvPr id="1" name=""/>
-        <p:cNvGrpSpPr/>
-        <p:nvPr/>
-      </p:nvGrpSpPr>
-      <p:grpSpPr>
-        <a:xfrm>
-          <a:off x="0" y="0"/>
-          <a:ext cx="0" cy="0"/>
-          <a:chOff x="0" y="0"/>
-          <a:chExt cx="0" cy="0"/>
-        </a:xfrm>
-      </p:grpSpPr>
-      <p:sp>
-        <p:nvSpPr>
-          <p:cNvPr id="2" name="Title 1"/>
-          <p:cNvSpPr>
-            <a:spLocks noGrp="1"/>
-          </p:cNvSpPr>
-          <p:nvPr>
-            <p:ph type="title"/>
-          </p:nvPr>
-        </p:nvSpPr>
-        <p:spPr>
-          <a:xfrm>
-            <a:off x="838200" y="299222"/>
-            <a:ext cx="10515600" cy="1325563"/>
-          </a:xfrm>
-        </p:spPr>
-        <p:txBody>
-          <a:bodyPr/>
-          <a:lstStyle/>
-          <a:p>
-            <a:pPr algn="ctr"/>
-            <a:r>
-              <a:rPr lang="en-US" b="1" dirty="0" smtClean="0"/>
-              <a:t>Sprint 3 – Description of tasks (2/4)</a:t>
-            </a:r>
-            <a:endParaRPr lang="en-US" dirty="0"/>
-          </a:p>
-        </p:txBody>
-      </p:sp>
-      <p:sp>
-        <p:nvSpPr>
-          <p:cNvPr id="3" name="내용 개체 틀 2"/>
-          <p:cNvSpPr>
-            <a:spLocks noGrp="1"/>
-          </p:cNvSpPr>
-          <p:nvPr>
-            <p:ph idx="1"/>
-          </p:nvPr>
-        </p:nvSpPr>
-        <p:spPr>
-          <a:xfrm>
-            <a:off x="411892" y="1958457"/>
-            <a:ext cx="11467070" cy="4144169"/>
-          </a:xfrm>
-        </p:spPr>
-        <p:txBody>
-          <a:bodyPr anchor="t">
-            <a:normAutofit/>
-          </a:bodyPr>
-          <a:lstStyle/>
-          <a:p>
-            <a:pPr marL="0" indent="0" algn="ctr">
-              <a:lnSpc>
-                <a:spcPct val="110000"/>
-              </a:lnSpc>
-              <a:buNone/>
-            </a:pPr>
-            <a:r>
-              <a:rPr lang="en-US" dirty="0" smtClean="0"/>
-              <a:t>6. Debug the </a:t>
-            </a:r>
-            <a:r>
-              <a:rPr lang="en-US" i="1" dirty="0" smtClean="0"/>
-              <a:t>Rank</a:t>
-            </a:r>
-            <a:r>
-              <a:rPr lang="en-US" dirty="0" smtClean="0"/>
-              <a:t> class through adding test cases that handle all possibilities of poker-hands in the </a:t>
-            </a:r>
-            <a:r>
-              <a:rPr lang="en-US" i="1" dirty="0" err="1" smtClean="0"/>
-              <a:t>TestRank</a:t>
-            </a:r>
-            <a:r>
-              <a:rPr lang="en-US" dirty="0"/>
-              <a:t> </a:t>
-            </a:r>
-            <a:r>
-              <a:rPr lang="en-US" dirty="0" smtClean="0"/>
-              <a:t>class. (</a:t>
-            </a:r>
-            <a:r>
-              <a:rPr lang="en-US" dirty="0"/>
-              <a:t>User Story 4)</a:t>
-            </a:r>
-          </a:p>
-          <a:p>
-            <a:pPr marL="0" indent="0" algn="ctr">
-              <a:lnSpc>
-                <a:spcPct val="110000"/>
-              </a:lnSpc>
-              <a:buNone/>
-            </a:pPr>
-            <a:endParaRPr lang="en-US" dirty="0"/>
-          </a:p>
-        </p:txBody>
-      </p:sp>
-    </p:spTree>
-    <p:extLst>
-      <p:ext uri="{BB962C8B-B14F-4D97-AF65-F5344CB8AC3E}">
-        <p14:creationId xmlns:p14="http://schemas.microsoft.com/office/powerpoint/2010/main" val="414686561"/>
-      </p:ext>
-    </p:extLst>
-  </p:cSld>
-  <p:clrMapOvr>
-    <a:masterClrMapping/>
-  </p:clrMapOvr>
-  <p:timing>
-    <p:tnLst>
-      <p:par>
-        <p:cTn id="1" dur="indefinite" restart="never" nodeType="tmRoot"/>
-      </p:par>
-    </p:tnLst>
-  </p:timing>
-</p:sld>
-</file>
-
-<file path=ppt/slides/slide11.xml><?xml version="1.0" encoding="utf-8"?>
-<p:sld xmlns:a="http://schemas.openxmlformats.org/drawingml/2006/main" xmlns:r="http://schemas.openxmlformats.org/officeDocument/2006/relationships" xmlns:p="http://schemas.openxmlformats.org/presentationml/2006/main">
-  <p:cSld>
-    <p:spTree>
-      <p:nvGrpSpPr>
-        <p:cNvPr id="1" name=""/>
-        <p:cNvGrpSpPr/>
-        <p:nvPr/>
-      </p:nvGrpSpPr>
-      <p:grpSpPr>
-        <a:xfrm>
-          <a:off x="0" y="0"/>
-          <a:ext cx="0" cy="0"/>
-          <a:chOff x="0" y="0"/>
-          <a:chExt cx="0" cy="0"/>
-        </a:xfrm>
-      </p:grpSpPr>
-      <p:sp>
-        <p:nvSpPr>
-          <p:cNvPr id="2" name="Title 1"/>
-          <p:cNvSpPr>
-            <a:spLocks noGrp="1"/>
-          </p:cNvSpPr>
-          <p:nvPr>
-            <p:ph type="title"/>
-          </p:nvPr>
-        </p:nvSpPr>
-        <p:spPr>
-          <a:xfrm>
-            <a:off x="838200" y="299222"/>
-            <a:ext cx="10515600" cy="1325563"/>
-          </a:xfrm>
-        </p:spPr>
-        <p:txBody>
-          <a:bodyPr/>
-          <a:lstStyle/>
-          <a:p>
-            <a:pPr algn="ctr"/>
-            <a:r>
-              <a:rPr lang="en-US" b="1" dirty="0" smtClean="0"/>
-              <a:t>Sprint 3 – Description of tasks (3/4)</a:t>
-            </a:r>
-            <a:endParaRPr lang="en-US" dirty="0"/>
-          </a:p>
-        </p:txBody>
-      </p:sp>
-      <p:sp>
-        <p:nvSpPr>
-          <p:cNvPr id="3" name="내용 개체 틀 2"/>
-          <p:cNvSpPr>
-            <a:spLocks noGrp="1"/>
-          </p:cNvSpPr>
-          <p:nvPr>
-            <p:ph idx="1"/>
-          </p:nvPr>
-        </p:nvSpPr>
-        <p:spPr>
-          <a:xfrm>
-            <a:off x="411892" y="1958457"/>
-            <a:ext cx="11467070" cy="4144169"/>
-          </a:xfrm>
-        </p:spPr>
-        <p:txBody>
-          <a:bodyPr anchor="t">
-            <a:normAutofit/>
-          </a:bodyPr>
-          <a:lstStyle/>
-          <a:p>
-            <a:pPr marL="0" indent="0" algn="ctr">
-              <a:lnSpc>
-                <a:spcPct val="110000"/>
-              </a:lnSpc>
-              <a:buNone/>
-            </a:pPr>
-            <a:r>
-              <a:rPr lang="en-US" dirty="0"/>
-              <a:t>7</a:t>
-            </a:r>
-            <a:r>
-              <a:rPr lang="en-US" dirty="0" smtClean="0"/>
-              <a:t>. Debug the </a:t>
-            </a:r>
-            <a:r>
-              <a:rPr lang="en-US" i="1" dirty="0" smtClean="0"/>
-              <a:t>GUI</a:t>
-            </a:r>
-            <a:r>
-              <a:rPr lang="en-US" dirty="0" smtClean="0"/>
-              <a:t> portion of the game by play-testing the game with all possible user inputs. (</a:t>
-            </a:r>
-            <a:r>
-              <a:rPr lang="en-US" dirty="0"/>
-              <a:t>User Story 4)</a:t>
-            </a:r>
-          </a:p>
-          <a:p>
-            <a:pPr marL="0" indent="0" algn="ctr">
-              <a:lnSpc>
-                <a:spcPct val="110000"/>
-              </a:lnSpc>
-              <a:buNone/>
-            </a:pPr>
-            <a:endParaRPr lang="en-US" dirty="0"/>
-          </a:p>
-        </p:txBody>
-      </p:sp>
-    </p:spTree>
-    <p:extLst>
-      <p:ext uri="{BB962C8B-B14F-4D97-AF65-F5344CB8AC3E}">
-        <p14:creationId xmlns:p14="http://schemas.microsoft.com/office/powerpoint/2010/main" val="3916496294"/>
-      </p:ext>
-    </p:extLst>
-  </p:cSld>
-  <p:clrMapOvr>
-    <a:masterClrMapping/>
-  </p:clrMapOvr>
-  <p:timing>
-    <p:tnLst>
-      <p:par>
-        <p:cTn id="1" dur="indefinite" restart="never" nodeType="tmRoot"/>
-      </p:par>
-    </p:tnLst>
-  </p:timing>
-</p:sld>
-</file>
-
-<file path=ppt/slides/slide12.xml><?xml version="1.0" encoding="utf-8"?>
-<p:sld xmlns:a="http://schemas.openxmlformats.org/drawingml/2006/main" xmlns:r="http://schemas.openxmlformats.org/officeDocument/2006/relationships" xmlns:p="http://schemas.openxmlformats.org/presentationml/2006/main">
-  <p:cSld>
-    <p:spTree>
-      <p:nvGrpSpPr>
-        <p:cNvPr id="1" name=""/>
-        <p:cNvGrpSpPr/>
-        <p:nvPr/>
-      </p:nvGrpSpPr>
-      <p:grpSpPr>
-        <a:xfrm>
-          <a:off x="0" y="0"/>
-          <a:ext cx="0" cy="0"/>
-          <a:chOff x="0" y="0"/>
-          <a:chExt cx="0" cy="0"/>
-        </a:xfrm>
-      </p:grpSpPr>
-      <p:sp>
-        <p:nvSpPr>
-          <p:cNvPr id="2" name="Title 1"/>
-          <p:cNvSpPr>
-            <a:spLocks noGrp="1"/>
-          </p:cNvSpPr>
-          <p:nvPr>
-            <p:ph type="title"/>
-          </p:nvPr>
-        </p:nvSpPr>
-        <p:spPr>
-          <a:xfrm>
-            <a:off x="838200" y="299222"/>
-            <a:ext cx="10515600" cy="1325563"/>
-          </a:xfrm>
-        </p:spPr>
-        <p:txBody>
-          <a:bodyPr/>
-          <a:lstStyle/>
-          <a:p>
-            <a:pPr algn="ctr"/>
-            <a:r>
-              <a:rPr lang="en-US" b="1" dirty="0" smtClean="0"/>
-              <a:t>Sprint 3 – Description of tasks (4/4)</a:t>
-            </a:r>
-            <a:endParaRPr lang="en-US" dirty="0"/>
-          </a:p>
-        </p:txBody>
-      </p:sp>
-      <p:sp>
-        <p:nvSpPr>
-          <p:cNvPr id="3" name="내용 개체 틀 2"/>
-          <p:cNvSpPr>
-            <a:spLocks noGrp="1"/>
-          </p:cNvSpPr>
-          <p:nvPr>
-            <p:ph idx="1"/>
-          </p:nvPr>
-        </p:nvSpPr>
-        <p:spPr>
-          <a:xfrm>
-            <a:off x="411892" y="1958457"/>
-            <a:ext cx="11467070" cy="4144169"/>
-          </a:xfrm>
-        </p:spPr>
-        <p:txBody>
-          <a:bodyPr anchor="t">
-            <a:normAutofit/>
-          </a:bodyPr>
-          <a:lstStyle/>
-          <a:p>
-            <a:pPr marL="0" indent="0" algn="ctr">
-              <a:lnSpc>
-                <a:spcPct val="110000"/>
-              </a:lnSpc>
-              <a:buNone/>
-            </a:pPr>
-            <a:r>
-              <a:rPr lang="en-US" dirty="0" smtClean="0"/>
-              <a:t>6. Debug the </a:t>
-            </a:r>
-            <a:r>
-              <a:rPr lang="en-US" i="1" dirty="0" err="1" smtClean="0"/>
-              <a:t>GameSystem</a:t>
-            </a:r>
-            <a:r>
-              <a:rPr lang="en-US" dirty="0"/>
-              <a:t> </a:t>
-            </a:r>
-            <a:r>
-              <a:rPr lang="en-US" dirty="0" smtClean="0"/>
-              <a:t>portion of the game by play-testing the game with all possible user inputs. (</a:t>
-            </a:r>
-            <a:r>
-              <a:rPr lang="en-US" dirty="0"/>
-              <a:t>User Story 4)</a:t>
-            </a:r>
-          </a:p>
-          <a:p>
-            <a:pPr marL="0" indent="0" algn="ctr">
-              <a:lnSpc>
-                <a:spcPct val="110000"/>
-              </a:lnSpc>
-              <a:buNone/>
-            </a:pPr>
-            <a:endParaRPr lang="en-US" dirty="0"/>
-          </a:p>
-        </p:txBody>
-      </p:sp>
-    </p:spTree>
-    <p:extLst>
-      <p:ext uri="{BB962C8B-B14F-4D97-AF65-F5344CB8AC3E}">
-        <p14:creationId xmlns:p14="http://schemas.microsoft.com/office/powerpoint/2010/main" val="505896355"/>
-      </p:ext>
-    </p:extLst>
-  </p:cSld>
-  <p:clrMapOvr>
-    <a:masterClrMapping/>
-  </p:clrMapOvr>
-  <p:timing>
-    <p:tnLst>
-      <p:par>
-        <p:cTn id="1" dur="indefinite" restart="never" nodeType="tmRoot"/>
-      </p:par>
-    </p:tnLst>
-  </p:timing>
-</p:sld>
-</file>
-
-<file path=ppt/slides/slide13.xml><?xml version="1.0" encoding="utf-8"?>
-<p:sld xmlns:a="http://schemas.openxmlformats.org/drawingml/2006/main" xmlns:r="http://schemas.openxmlformats.org/officeDocument/2006/relationships" xmlns:p="http://schemas.openxmlformats.org/presentationml/2006/main">
-  <p:cSld>
-    <p:spTree>
-      <p:nvGrpSpPr>
-        <p:cNvPr id="1" name=""/>
-        <p:cNvGrpSpPr/>
-        <p:nvPr/>
-      </p:nvGrpSpPr>
-      <p:grpSpPr>
-        <a:xfrm>
-          <a:off x="0" y="0"/>
-          <a:ext cx="0" cy="0"/>
-          <a:chOff x="0" y="0"/>
-          <a:chExt cx="0" cy="0"/>
-        </a:xfrm>
-      </p:grpSpPr>
-      <p:sp>
-        <p:nvSpPr>
-          <p:cNvPr id="2" name="Title 1"/>
-          <p:cNvSpPr>
-            <a:spLocks noGrp="1"/>
-          </p:cNvSpPr>
-          <p:nvPr>
-            <p:ph type="title"/>
-          </p:nvPr>
-        </p:nvSpPr>
-        <p:spPr>
-          <a:xfrm>
-            <a:off x="952504" y="260757"/>
-            <a:ext cx="10515600" cy="6154945"/>
-          </a:xfrm>
-        </p:spPr>
-        <p:txBody>
-          <a:bodyPr>
-            <a:normAutofit/>
-          </a:bodyPr>
-          <a:lstStyle/>
-          <a:p>
-            <a:pPr algn="ctr"/>
-            <a:r>
-              <a:rPr lang="en-US" sz="8800" dirty="0" smtClean="0"/>
-              <a:t>Thank you!</a:t>
-            </a:r>
-            <a:endParaRPr lang="en-US" sz="8800" dirty="0"/>
-          </a:p>
-        </p:txBody>
-      </p:sp>
-    </p:spTree>
-    <p:extLst>
-      <p:ext uri="{BB962C8B-B14F-4D97-AF65-F5344CB8AC3E}">
-        <p14:creationId xmlns:p14="http://schemas.microsoft.com/office/powerpoint/2010/main" val="2541804532"/>
-      </p:ext>
-    </p:extLst>
-  </p:cSld>
-  <p:clrMapOvr>
-    <a:masterClrMapping/>
-  </p:clrMapOvr>
-  <p:timing>
-    <p:tnLst>
-      <p:par>
-        <p:cTn id="1" dur="indefinite" restart="never" nodeType="tmRoot"/>
-      </p:par>
-    </p:tnLst>
-  </p:timing>
-</p:sld>
-</file>
-
 <file path=ppt/slides/slide2.xml><?xml version="1.0" encoding="utf-8"?>
 <p:sld xmlns:a="http://schemas.openxmlformats.org/drawingml/2006/main" xmlns:r="http://schemas.openxmlformats.org/officeDocument/2006/relationships" xmlns:p="http://schemas.openxmlformats.org/presentationml/2006/main">
   <p:cSld>
@@ -3897,94 +3437,6 @@
 </file>
 
 <file path=ppt/slides/slide4.xml><?xml version="1.0" encoding="utf-8"?>
-<p:sld xmlns:a="http://schemas.openxmlformats.org/drawingml/2006/main" xmlns:r="http://schemas.openxmlformats.org/officeDocument/2006/relationships" xmlns:p="http://schemas.openxmlformats.org/presentationml/2006/main">
-  <p:cSld>
-    <p:spTree>
-      <p:nvGrpSpPr>
-        <p:cNvPr id="1" name=""/>
-        <p:cNvGrpSpPr/>
-        <p:nvPr/>
-      </p:nvGrpSpPr>
-      <p:grpSpPr>
-        <a:xfrm>
-          <a:off x="0" y="0"/>
-          <a:ext cx="0" cy="0"/>
-          <a:chOff x="0" y="0"/>
-          <a:chExt cx="0" cy="0"/>
-        </a:xfrm>
-      </p:grpSpPr>
-      <p:sp>
-        <p:nvSpPr>
-          <p:cNvPr id="2" name="Title 1"/>
-          <p:cNvSpPr>
-            <a:spLocks noGrp="1"/>
-          </p:cNvSpPr>
-          <p:nvPr>
-            <p:ph type="title"/>
-          </p:nvPr>
-        </p:nvSpPr>
-        <p:spPr/>
-        <p:txBody>
-          <a:bodyPr/>
-          <a:lstStyle/>
-          <a:p>
-            <a:r>
-              <a:rPr lang="en-US" dirty="0" smtClean="0"/>
-              <a:t>Project Goals</a:t>
-            </a:r>
-            <a:endParaRPr lang="en-US" dirty="0"/>
-          </a:p>
-        </p:txBody>
-      </p:sp>
-      <p:sp>
-        <p:nvSpPr>
-          <p:cNvPr id="3" name="Content Placeholder 2"/>
-          <p:cNvSpPr>
-            <a:spLocks noGrp="1"/>
-          </p:cNvSpPr>
-          <p:nvPr>
-            <p:ph idx="1"/>
-          </p:nvPr>
-        </p:nvSpPr>
-        <p:spPr/>
-        <p:txBody>
-          <a:bodyPr/>
-          <a:lstStyle/>
-          <a:p>
-            <a:r>
-              <a:rPr lang="en-US" dirty="0" smtClean="0"/>
-              <a:t>Performance</a:t>
-            </a:r>
-          </a:p>
-          <a:p>
-            <a:r>
-              <a:rPr lang="en-US" dirty="0" smtClean="0"/>
-              <a:t>Reliability</a:t>
-            </a:r>
-          </a:p>
-          <a:p>
-            <a:r>
-              <a:rPr lang="en-US" dirty="0" smtClean="0"/>
-              <a:t>Usability</a:t>
-            </a:r>
-            <a:endParaRPr lang="en-US" dirty="0"/>
-          </a:p>
-        </p:txBody>
-      </p:sp>
-    </p:spTree>
-    <p:extLst>
-      <p:ext uri="{BB962C8B-B14F-4D97-AF65-F5344CB8AC3E}">
-        <p14:creationId xmlns:p14="http://schemas.microsoft.com/office/powerpoint/2010/main" val="1732382435"/>
-      </p:ext>
-    </p:extLst>
-  </p:cSld>
-  <p:clrMapOvr>
-    <a:masterClrMapping/>
-  </p:clrMapOvr>
-</p:sld>
-</file>
-
-<file path=ppt/slides/slide5.xml><?xml version="1.0" encoding="utf-8"?>
 <p:sld xmlns:a="http://schemas.openxmlformats.org/drawingml/2006/main" xmlns:r="http://schemas.openxmlformats.org/officeDocument/2006/relationships" xmlns:p="http://schemas.openxmlformats.org/presentationml/2006/main">
   <p:cSld>
     <p:spTree>
@@ -4085,7 +3537,7 @@
 </p:sld>
 </file>
 
-<file path=ppt/slides/slide6.xml><?xml version="1.0" encoding="utf-8"?>
+<file path=ppt/slides/slide5.xml><?xml version="1.0" encoding="utf-8"?>
 <p:sld xmlns:a="http://schemas.openxmlformats.org/drawingml/2006/main" xmlns:r="http://schemas.openxmlformats.org/officeDocument/2006/relationships" xmlns:p="http://schemas.openxmlformats.org/presentationml/2006/main">
   <p:cSld>
     <p:spTree>
@@ -4149,7 +3601,7 @@
 </p:sld>
 </file>
 
-<file path=ppt/slides/slide7.xml><?xml version="1.0" encoding="utf-8"?>
+<file path=ppt/slides/slide6.xml><?xml version="1.0" encoding="utf-8"?>
 <p:sld xmlns:a="http://schemas.openxmlformats.org/drawingml/2006/main" xmlns:r="http://schemas.openxmlformats.org/officeDocument/2006/relationships" xmlns:p="http://schemas.openxmlformats.org/presentationml/2006/main">
   <p:cSld>
     <p:spTree>
@@ -4217,7 +3669,7 @@
 </p:sld>
 </file>
 
-<file path=ppt/slides/slide8.xml><?xml version="1.0" encoding="utf-8"?>
+<file path=ppt/slides/slide7.xml><?xml version="1.0" encoding="utf-8"?>
 <p:sld xmlns:a="http://schemas.openxmlformats.org/drawingml/2006/main" xmlns:r="http://schemas.openxmlformats.org/officeDocument/2006/relationships" xmlns:p="http://schemas.openxmlformats.org/presentationml/2006/main">
   <p:cSld>
     <p:spTree>
@@ -4244,157 +3696,31 @@
             <p:ph type="title"/>
           </p:nvPr>
         </p:nvSpPr>
-        <p:spPr/>
-        <p:txBody>
-          <a:bodyPr/>
-          <a:lstStyle/>
-          <a:p>
-            <a:endParaRPr lang="en-US"/>
-          </a:p>
-        </p:txBody>
-      </p:sp>
-      <p:sp>
-        <p:nvSpPr>
-          <p:cNvPr id="3" name="Content Placeholder 2"/>
-          <p:cNvSpPr>
-            <a:spLocks noGrp="1"/>
-          </p:cNvSpPr>
-          <p:nvPr>
-            <p:ph idx="1"/>
-          </p:nvPr>
-        </p:nvSpPr>
-        <p:spPr/>
-        <p:txBody>
-          <a:bodyPr/>
-          <a:lstStyle/>
-          <a:p>
-            <a:endParaRPr lang="en-US"/>
+        <p:spPr>
+          <a:xfrm>
+            <a:off x="952504" y="260757"/>
+            <a:ext cx="10515600" cy="6154945"/>
+          </a:xfrm>
+        </p:spPr>
+        <p:txBody>
+          <a:bodyPr>
+            <a:normAutofit/>
+          </a:bodyPr>
+          <a:lstStyle/>
+          <a:p>
+            <a:pPr algn="ctr"/>
+            <a:r>
+              <a:rPr lang="en-US" sz="8800" dirty="0" smtClean="0"/>
+              <a:t>Thank you!</a:t>
+            </a:r>
+            <a:endParaRPr lang="en-US" sz="8800" dirty="0"/>
           </a:p>
         </p:txBody>
       </p:sp>
     </p:spTree>
     <p:extLst>
       <p:ext uri="{BB962C8B-B14F-4D97-AF65-F5344CB8AC3E}">
-        <p14:creationId xmlns:p14="http://schemas.microsoft.com/office/powerpoint/2010/main" val="1512136813"/>
-      </p:ext>
-    </p:extLst>
-  </p:cSld>
-  <p:clrMapOvr>
-    <a:masterClrMapping/>
-  </p:clrMapOvr>
-  <p:timing>
-    <p:tnLst>
-      <p:par>
-        <p:cTn id="1" dur="indefinite" restart="never" nodeType="tmRoot"/>
-      </p:par>
-    </p:tnLst>
-  </p:timing>
-</p:sld>
-</file>
-
-<file path=ppt/slides/slide9.xml><?xml version="1.0" encoding="utf-8"?>
-<p:sld xmlns:a="http://schemas.openxmlformats.org/drawingml/2006/main" xmlns:r="http://schemas.openxmlformats.org/officeDocument/2006/relationships" xmlns:p="http://schemas.openxmlformats.org/presentationml/2006/main">
-  <p:cSld>
-    <p:spTree>
-      <p:nvGrpSpPr>
-        <p:cNvPr id="1" name=""/>
-        <p:cNvGrpSpPr/>
-        <p:nvPr/>
-      </p:nvGrpSpPr>
-      <p:grpSpPr>
-        <a:xfrm>
-          <a:off x="0" y="0"/>
-          <a:ext cx="0" cy="0"/>
-          <a:chOff x="0" y="0"/>
-          <a:chExt cx="0" cy="0"/>
-        </a:xfrm>
-      </p:grpSpPr>
-      <p:sp>
-        <p:nvSpPr>
-          <p:cNvPr id="2" name="Title 1"/>
-          <p:cNvSpPr>
-            <a:spLocks noGrp="1"/>
-          </p:cNvSpPr>
-          <p:nvPr>
-            <p:ph type="title"/>
-          </p:nvPr>
-        </p:nvSpPr>
-        <p:spPr>
-          <a:xfrm>
-            <a:off x="838200" y="299222"/>
-            <a:ext cx="10515600" cy="1325563"/>
-          </a:xfrm>
-        </p:spPr>
-        <p:txBody>
-          <a:bodyPr/>
-          <a:lstStyle/>
-          <a:p>
-            <a:pPr algn="ctr"/>
-            <a:r>
-              <a:rPr lang="en-US" b="1" dirty="0" smtClean="0"/>
-              <a:t>Sprint 3 – Description of tasks (1/4)</a:t>
-            </a:r>
-            <a:endParaRPr lang="en-US" dirty="0"/>
-          </a:p>
-        </p:txBody>
-      </p:sp>
-      <p:sp>
-        <p:nvSpPr>
-          <p:cNvPr id="3" name="내용 개체 틀 2"/>
-          <p:cNvSpPr>
-            <a:spLocks noGrp="1"/>
-          </p:cNvSpPr>
-          <p:nvPr>
-            <p:ph idx="1"/>
-          </p:nvPr>
-        </p:nvSpPr>
-        <p:spPr>
-          <a:xfrm>
-            <a:off x="411892" y="1958457"/>
-            <a:ext cx="11467070" cy="4144169"/>
-          </a:xfrm>
-        </p:spPr>
-        <p:txBody>
-          <a:bodyPr anchor="t">
-            <a:normAutofit/>
-          </a:bodyPr>
-          <a:lstStyle/>
-          <a:p>
-            <a:pPr marL="0" indent="0" algn="ctr">
-              <a:lnSpc>
-                <a:spcPct val="110000"/>
-              </a:lnSpc>
-              <a:buNone/>
-            </a:pPr>
-            <a:r>
-              <a:rPr lang="en-US" dirty="0" smtClean="0"/>
-              <a:t>1. Integrate the animations to correctly respond to received </a:t>
-            </a:r>
-            <a:r>
-              <a:rPr lang="en-US" i="1" dirty="0" err="1" smtClean="0"/>
-              <a:t>GameState</a:t>
-            </a:r>
-            <a:r>
-              <a:rPr lang="en-US" dirty="0" smtClean="0"/>
-              <a:t> from the host to show each player’s actions. (User Story 1)</a:t>
-            </a:r>
-            <a:endParaRPr lang="en-US" dirty="0"/>
-          </a:p>
-          <a:p>
-            <a:pPr marL="0" indent="0" algn="ctr">
-              <a:lnSpc>
-                <a:spcPct val="110000"/>
-              </a:lnSpc>
-              <a:buNone/>
-            </a:pPr>
-            <a:endParaRPr lang="en-US" dirty="0"/>
-          </a:p>
-        </p:txBody>
-      </p:sp>
-    </p:spTree>
-    <p:extLst>
-      <p:ext uri="{BB962C8B-B14F-4D97-AF65-F5344CB8AC3E}">
-        <p14:creationId xmlns:p14="http://schemas.microsoft.com/office/powerpoint/2010/main" val="1354750929"/>
+        <p14:creationId xmlns:p14="http://schemas.microsoft.com/office/powerpoint/2010/main" val="2541804532"/>
       </p:ext>
     </p:extLst>
   </p:cSld>
@@ -4666,7 +3992,7 @@
   <a:extraClrSchemeLst/>
   <a:extLst>
     <a:ext uri="{05A4C25C-085E-4340-85A3-A5531E510DB2}">
-      <thm15:themeFamily xmlns:thm15="http://schemas.microsoft.com/office/thememl/2012/main" xmlns="" name="Office Theme" id="{62F939B6-93AF-4DB8-9C6B-D6C7DFDC589F}" vid="{4F46216B-77A9-411A-B9D3-5023FCB70208}"/>
+      <thm15:themeFamily xmlns="" xmlns:thm15="http://schemas.microsoft.com/office/thememl/2012/main" name="Office Theme" id="{62F939B6-93AF-4DB8-9C6B-D6C7DFDC589F}" vid="{4F46216B-77A9-411A-B9D3-5023FCB70208}"/>
     </a:ext>
   </a:extLst>
 </a:theme>

</xml_diff>